<commit_message>
Add Intro Slide for presentation
</commit_message>
<xml_diff>
--- a/doc/Presentation1.pptx
+++ b/doc/Presentation1.pptx
@@ -3432,36 +3432,6 @@
           </a:p>
         </p:txBody>
       </p:sp>
-      <p:pic>
-        <p:nvPicPr>
-          <p:cNvPr id="4" name="Picture 3"/>
-          <p:cNvPicPr>
-            <a:picLocks noChangeAspect="1"/>
-          </p:cNvPicPr>
-          <p:nvPr/>
-        </p:nvPicPr>
-        <p:blipFill>
-          <a:blip r:embed="rId2">
-            <a:extLst>
-              <a:ext uri="{28A0092B-C50C-407E-A947-70E740481C1C}">
-                <a14:useLocalDpi xmlns:a14="http://schemas.microsoft.com/office/drawing/2010/main" val="0"/>
-              </a:ext>
-            </a:extLst>
-          </a:blip>
-          <a:stretch>
-            <a:fillRect/>
-          </a:stretch>
-        </p:blipFill>
-        <p:spPr>
-          <a:xfrm>
-            <a:off x="101600" y="604838"/>
-            <a:ext cx="5791200" cy="5791200"/>
-          </a:xfrm>
-          <a:prstGeom prst="rect">
-            <a:avLst/>
-          </a:prstGeom>
-        </p:spPr>
-      </p:pic>
       <p:cxnSp>
         <p:nvCxnSpPr>
           <p:cNvPr id="6" name="Straight Connector 5"/>
@@ -3470,7 +3440,7 @@
         </p:nvCxnSpPr>
         <p:spPr>
           <a:xfrm>
-            <a:off x="6005015" y="2052638"/>
+            <a:off x="6005015" y="2071191"/>
             <a:ext cx="3889612" cy="0"/>
           </a:xfrm>
           <a:prstGeom prst="line">
@@ -3497,6 +3467,213 @@
           </a:fontRef>
         </p:style>
       </p:cxnSp>
+      <p:pic>
+        <p:nvPicPr>
+          <p:cNvPr id="7" name="Picture 6"/>
+          <p:cNvPicPr>
+            <a:picLocks noChangeAspect="1"/>
+          </p:cNvPicPr>
+          <p:nvPr/>
+        </p:nvPicPr>
+        <p:blipFill>
+          <a:blip r:embed="rId2">
+            <a:extLst>
+              <a:ext uri="{28A0092B-C50C-407E-A947-70E740481C1C}">
+                <a14:useLocalDpi xmlns:a14="http://schemas.microsoft.com/office/drawing/2010/main" val="0"/>
+              </a:ext>
+            </a:extLst>
+          </a:blip>
+          <a:stretch>
+            <a:fillRect/>
+          </a:stretch>
+        </p:blipFill>
+        <p:spPr>
+          <a:xfrm>
+            <a:off x="-109678" y="511908"/>
+            <a:ext cx="5872572" cy="5872572"/>
+          </a:xfrm>
+          <a:prstGeom prst="rect">
+            <a:avLst/>
+          </a:prstGeom>
+        </p:spPr>
+      </p:pic>
+      <p:sp>
+        <p:nvSpPr>
+          <p:cNvPr id="9" name="TextBox 8"/>
+          <p:cNvSpPr txBox="1"/>
+          <p:nvPr/>
+        </p:nvSpPr>
+        <p:spPr>
+          <a:xfrm>
+            <a:off x="6091995" y="4353155"/>
+            <a:ext cx="4886325" cy="2031325"/>
+          </a:xfrm>
+          <a:prstGeom prst="rect">
+            <a:avLst/>
+          </a:prstGeom>
+          <a:noFill/>
+        </p:spPr>
+        <p:txBody>
+          <a:bodyPr wrap="square" rtlCol="0">
+            <a:spAutoFit/>
+          </a:bodyPr>
+          <a:lstStyle/>
+          <a:p>
+            <a:r>
+              <a:rPr lang="en-US" dirty="0" smtClean="0">
+                <a:latin typeface="Avenir Book" charset="0"/>
+                <a:ea typeface="Avenir Book" charset="0"/>
+                <a:cs typeface="Avenir Book" charset="0"/>
+              </a:rPr>
+              <a:t>By</a:t>
+            </a:r>
+          </a:p>
+          <a:p>
+            <a:r>
+              <a:rPr lang="en-US" dirty="0" smtClean="0">
+                <a:latin typeface="Avenir Book" charset="0"/>
+                <a:ea typeface="Avenir Book" charset="0"/>
+                <a:cs typeface="Avenir Book" charset="0"/>
+              </a:rPr>
+              <a:t>Tom </a:t>
+            </a:r>
+            <a:r>
+              <a:rPr lang="en-US" dirty="0" err="1" smtClean="0">
+                <a:latin typeface="Avenir Book" charset="0"/>
+                <a:ea typeface="Avenir Book" charset="0"/>
+                <a:cs typeface="Avenir Book" charset="0"/>
+              </a:rPr>
+              <a:t>Hüttmann</a:t>
+            </a:r>
+            <a:r>
+              <a:rPr lang="en-US" dirty="0" smtClean="0">
+                <a:latin typeface="Avenir Book" charset="0"/>
+                <a:ea typeface="Avenir Book" charset="0"/>
+                <a:cs typeface="Avenir Book" charset="0"/>
+              </a:rPr>
+              <a:t> (</a:t>
+            </a:r>
+            <a:r>
+              <a:rPr lang="en-US" dirty="0" err="1" smtClean="0">
+                <a:latin typeface="Avenir Book" charset="0"/>
+                <a:ea typeface="Avenir Book" charset="0"/>
+                <a:cs typeface="Avenir Book" charset="0"/>
+              </a:rPr>
+              <a:t>Teamlead</a:t>
+            </a:r>
+            <a:r>
+              <a:rPr lang="en-US" dirty="0" smtClean="0">
+                <a:latin typeface="Avenir Book" charset="0"/>
+                <a:ea typeface="Avenir Book" charset="0"/>
+                <a:cs typeface="Avenir Book" charset="0"/>
+              </a:rPr>
+              <a:t>)</a:t>
+            </a:r>
+            <a:endParaRPr lang="en-US" dirty="0" smtClean="0">
+              <a:latin typeface="Avenir Book" charset="0"/>
+              <a:ea typeface="Avenir Book" charset="0"/>
+              <a:cs typeface="Avenir Book" charset="0"/>
+            </a:endParaRPr>
+          </a:p>
+          <a:p>
+            <a:r>
+              <a:rPr lang="en-US" dirty="0" smtClean="0">
+                <a:latin typeface="Avenir Book" charset="0"/>
+                <a:ea typeface="Avenir Book" charset="0"/>
+                <a:cs typeface="Avenir Book" charset="0"/>
+              </a:rPr>
+              <a:t>Hoang Nguyen</a:t>
+            </a:r>
+          </a:p>
+          <a:p>
+            <a:r>
+              <a:rPr lang="en-US" dirty="0" smtClean="0">
+                <a:latin typeface="Avenir Book" charset="0"/>
+                <a:ea typeface="Avenir Book" charset="0"/>
+                <a:cs typeface="Avenir Book" charset="0"/>
+              </a:rPr>
+              <a:t>Michael Brandt</a:t>
+            </a:r>
+          </a:p>
+          <a:p>
+            <a:r>
+              <a:rPr lang="en-US" dirty="0" err="1" smtClean="0">
+                <a:latin typeface="Avenir Book" charset="0"/>
+                <a:ea typeface="Avenir Book" charset="0"/>
+                <a:cs typeface="Avenir Book" charset="0"/>
+              </a:rPr>
+              <a:t>Sören</a:t>
+            </a:r>
+            <a:r>
+              <a:rPr lang="en-US" dirty="0" smtClean="0">
+                <a:latin typeface="Avenir Book" charset="0"/>
+                <a:ea typeface="Avenir Book" charset="0"/>
+                <a:cs typeface="Avenir Book" charset="0"/>
+              </a:rPr>
+              <a:t> </a:t>
+            </a:r>
+            <a:r>
+              <a:rPr lang="en-US" dirty="0" err="1" smtClean="0">
+                <a:latin typeface="Avenir Book" charset="0"/>
+                <a:ea typeface="Avenir Book" charset="0"/>
+                <a:cs typeface="Avenir Book" charset="0"/>
+              </a:rPr>
+              <a:t>Poppe</a:t>
+            </a:r>
+            <a:endParaRPr lang="en-US" dirty="0" smtClean="0">
+              <a:latin typeface="Avenir Book" charset="0"/>
+              <a:ea typeface="Avenir Book" charset="0"/>
+              <a:cs typeface="Avenir Book" charset="0"/>
+            </a:endParaRPr>
+          </a:p>
+          <a:p>
+            <a:r>
+              <a:rPr lang="en-US" dirty="0" smtClean="0">
+                <a:latin typeface="Avenir Book" charset="0"/>
+                <a:ea typeface="Avenir Book" charset="0"/>
+                <a:cs typeface="Avenir Book" charset="0"/>
+              </a:rPr>
+              <a:t>David </a:t>
+            </a:r>
+            <a:r>
+              <a:rPr lang="en-US" dirty="0" err="1" smtClean="0">
+                <a:latin typeface="Avenir Book" charset="0"/>
+                <a:ea typeface="Avenir Book" charset="0"/>
+                <a:cs typeface="Avenir Book" charset="0"/>
+              </a:rPr>
+              <a:t>Szustowski</a:t>
+            </a:r>
+            <a:endParaRPr lang="en-US" dirty="0" smtClean="0">
+              <a:latin typeface="Avenir Book" charset="0"/>
+              <a:ea typeface="Avenir Book" charset="0"/>
+              <a:cs typeface="Avenir Book" charset="0"/>
+            </a:endParaRPr>
+          </a:p>
+          <a:p>
+            <a:r>
+              <a:rPr lang="en-US" dirty="0" err="1" smtClean="0">
+                <a:latin typeface="Avenir Book" charset="0"/>
+                <a:ea typeface="Avenir Book" charset="0"/>
+                <a:cs typeface="Avenir Book" charset="0"/>
+              </a:rPr>
+              <a:t>Niklas</a:t>
+            </a:r>
+            <a:r>
+              <a:rPr lang="en-US" dirty="0" smtClean="0">
+                <a:latin typeface="Avenir Book" charset="0"/>
+                <a:ea typeface="Avenir Book" charset="0"/>
+                <a:cs typeface="Avenir Book" charset="0"/>
+              </a:rPr>
+              <a:t> Mohr</a:t>
+            </a:r>
+            <a:endParaRPr lang="en-US" dirty="0">
+              <a:latin typeface="Avenir Book" charset="0"/>
+              <a:ea typeface="Avenir Book" charset="0"/>
+              <a:cs typeface="Avenir Book" charset="0"/>
+            </a:endParaRPr>
+          </a:p>
+        </p:txBody>
+      </p:sp>
     </p:spTree>
     <p:extLst>
       <p:ext uri="{BB962C8B-B14F-4D97-AF65-F5344CB8AC3E}">
@@ -3539,25 +3716,25 @@
         </p:nvSpPr>
         <p:spPr>
           <a:xfrm>
-            <a:off x="5791200" y="1216089"/>
-            <a:ext cx="4131733" cy="873125"/>
+            <a:off x="2208245" y="2052735"/>
+            <a:ext cx="7327641" cy="2238504"/>
           </a:xfrm>
         </p:spPr>
         <p:txBody>
           <a:bodyPr>
-            <a:normAutofit fontScale="90000"/>
+            <a:noAutofit/>
           </a:bodyPr>
           <a:lstStyle/>
           <a:p>
             <a:r>
-              <a:rPr lang="en-US" smtClean="0">
+              <a:rPr lang="en-US" sz="8800" dirty="0" smtClean="0">
                 <a:latin typeface="Avenir Book" charset="0"/>
                 <a:ea typeface="Avenir Book" charset="0"/>
                 <a:cs typeface="Avenir Book" charset="0"/>
               </a:rPr>
-              <a:t>Content</a:t>
-            </a:r>
-            <a:endParaRPr lang="en-US" dirty="0">
+              <a:t>DEMO</a:t>
+            </a:r>
+            <a:endParaRPr lang="en-US" sz="8800" dirty="0">
               <a:latin typeface="Avenir Book" charset="0"/>
               <a:ea typeface="Avenir Book" charset="0"/>
               <a:cs typeface="Avenir Book" charset="0"/>
@@ -3565,117 +3742,6 @@
           </a:p>
         </p:txBody>
       </p:sp>
-      <p:sp>
-        <p:nvSpPr>
-          <p:cNvPr id="3" name="Subtitle 2"/>
-          <p:cNvSpPr>
-            <a:spLocks noGrp="1"/>
-          </p:cNvSpPr>
-          <p:nvPr>
-            <p:ph type="subTitle" idx="1"/>
-          </p:nvPr>
-        </p:nvSpPr>
-        <p:spPr>
-          <a:xfrm>
-            <a:off x="5668370" y="2226829"/>
-            <a:ext cx="5530376" cy="1655762"/>
-          </a:xfrm>
-        </p:spPr>
-        <p:txBody>
-          <a:bodyPr/>
-          <a:lstStyle/>
-          <a:p>
-            <a:r>
-              <a:rPr lang="en-US" dirty="0" err="1" smtClean="0">
-                <a:latin typeface="Avenir Book" charset="0"/>
-                <a:ea typeface="Avenir Book" charset="0"/>
-                <a:cs typeface="Avenir Book" charset="0"/>
-              </a:rPr>
-              <a:t>Networkcalculator</a:t>
-            </a:r>
-            <a:r>
-              <a:rPr lang="en-US" dirty="0" smtClean="0">
-                <a:latin typeface="Avenir Book" charset="0"/>
-                <a:ea typeface="Avenir Book" charset="0"/>
-                <a:cs typeface="Avenir Book" charset="0"/>
-              </a:rPr>
-              <a:t> for the </a:t>
-            </a:r>
-            <a:r>
-              <a:rPr lang="en-US" dirty="0" err="1" smtClean="0">
-                <a:latin typeface="Avenir Book" charset="0"/>
-                <a:ea typeface="Avenir Book" charset="0"/>
-                <a:cs typeface="Avenir Book" charset="0"/>
-              </a:rPr>
-              <a:t>echt</a:t>
-            </a:r>
-            <a:r>
-              <a:rPr lang="en-US" dirty="0" smtClean="0">
-                <a:latin typeface="Avenir Book" charset="0"/>
-                <a:ea typeface="Avenir Book" charset="0"/>
-                <a:cs typeface="Avenir Book" charset="0"/>
-              </a:rPr>
-              <a:t> </a:t>
-            </a:r>
-            <a:r>
-              <a:rPr lang="en-US" dirty="0">
-                <a:latin typeface="Avenir Book" charset="0"/>
-                <a:ea typeface="Avenir Book" charset="0"/>
-                <a:cs typeface="Avenir Book" charset="0"/>
-              </a:rPr>
-              <a:t>G</a:t>
-            </a:r>
-            <a:r>
-              <a:rPr lang="en-US" dirty="0" smtClean="0">
-                <a:latin typeface="Avenir Book" charset="0"/>
-                <a:ea typeface="Avenir Book" charset="0"/>
-                <a:cs typeface="Avenir Book" charset="0"/>
-              </a:rPr>
-              <a:t>mbH</a:t>
-            </a:r>
-            <a:endParaRPr lang="en-US" dirty="0">
-              <a:latin typeface="Avenir Book" charset="0"/>
-              <a:ea typeface="Avenir Book" charset="0"/>
-              <a:cs typeface="Avenir Book" charset="0"/>
-            </a:endParaRPr>
-          </a:p>
-        </p:txBody>
-      </p:sp>
-      <p:cxnSp>
-        <p:nvCxnSpPr>
-          <p:cNvPr id="6" name="Straight Connector 5"/>
-          <p:cNvCxnSpPr/>
-          <p:nvPr/>
-        </p:nvCxnSpPr>
-        <p:spPr>
-          <a:xfrm>
-            <a:off x="5903415" y="2089214"/>
-            <a:ext cx="3889612" cy="0"/>
-          </a:xfrm>
-          <a:prstGeom prst="line">
-            <a:avLst/>
-          </a:prstGeom>
-          <a:ln>
-            <a:solidFill>
-              <a:schemeClr val="tx1"/>
-            </a:solidFill>
-          </a:ln>
-        </p:spPr>
-        <p:style>
-          <a:lnRef idx="1">
-            <a:schemeClr val="accent1"/>
-          </a:lnRef>
-          <a:fillRef idx="0">
-            <a:schemeClr val="accent1"/>
-          </a:fillRef>
-          <a:effectRef idx="0">
-            <a:schemeClr val="accent1"/>
-          </a:effectRef>
-          <a:fontRef idx="minor">
-            <a:schemeClr val="tx1"/>
-          </a:fontRef>
-        </p:style>
-      </p:cxnSp>
     </p:spTree>
     <p:extLst>
       <p:ext uri="{BB962C8B-B14F-4D97-AF65-F5344CB8AC3E}">

</xml_diff>